<commit_message>
minor updates after research talk
</commit_message>
<xml_diff>
--- a/tests/figs/maps/Fig-density.pptx
+++ b/tests/figs/maps/Fig-density.pptx
@@ -243,7 +243,7 @@
           <a:p>
             <a:fld id="{0D3E6E08-9DEF-8541-B93C-8A20B69D139D}" type="datetimeFigureOut">
               <a:rPr lang="en-US" smtClean="0"/>
-              <a:t>5/24/22</a:t>
+              <a:t>10/27/22</a:t>
             </a:fld>
             <a:endParaRPr lang="en-US"/>
           </a:p>
@@ -413,7 +413,7 @@
           <a:p>
             <a:fld id="{0D3E6E08-9DEF-8541-B93C-8A20B69D139D}" type="datetimeFigureOut">
               <a:rPr lang="en-US" smtClean="0"/>
-              <a:t>5/24/22</a:t>
+              <a:t>10/27/22</a:t>
             </a:fld>
             <a:endParaRPr lang="en-US"/>
           </a:p>
@@ -593,7 +593,7 @@
           <a:p>
             <a:fld id="{0D3E6E08-9DEF-8541-B93C-8A20B69D139D}" type="datetimeFigureOut">
               <a:rPr lang="en-US" smtClean="0"/>
-              <a:t>5/24/22</a:t>
+              <a:t>10/27/22</a:t>
             </a:fld>
             <a:endParaRPr lang="en-US"/>
           </a:p>
@@ -763,7 +763,7 @@
           <a:p>
             <a:fld id="{0D3E6E08-9DEF-8541-B93C-8A20B69D139D}" type="datetimeFigureOut">
               <a:rPr lang="en-US" smtClean="0"/>
-              <a:t>5/24/22</a:t>
+              <a:t>10/27/22</a:t>
             </a:fld>
             <a:endParaRPr lang="en-US"/>
           </a:p>
@@ -1009,7 +1009,7 @@
           <a:p>
             <a:fld id="{0D3E6E08-9DEF-8541-B93C-8A20B69D139D}" type="datetimeFigureOut">
               <a:rPr lang="en-US" smtClean="0"/>
-              <a:t>5/24/22</a:t>
+              <a:t>10/27/22</a:t>
             </a:fld>
             <a:endParaRPr lang="en-US"/>
           </a:p>
@@ -1241,7 +1241,7 @@
           <a:p>
             <a:fld id="{0D3E6E08-9DEF-8541-B93C-8A20B69D139D}" type="datetimeFigureOut">
               <a:rPr lang="en-US" smtClean="0"/>
-              <a:t>5/24/22</a:t>
+              <a:t>10/27/22</a:t>
             </a:fld>
             <a:endParaRPr lang="en-US"/>
           </a:p>
@@ -1608,7 +1608,7 @@
           <a:p>
             <a:fld id="{0D3E6E08-9DEF-8541-B93C-8A20B69D139D}" type="datetimeFigureOut">
               <a:rPr lang="en-US" smtClean="0"/>
-              <a:t>5/24/22</a:t>
+              <a:t>10/27/22</a:t>
             </a:fld>
             <a:endParaRPr lang="en-US"/>
           </a:p>
@@ -1726,7 +1726,7 @@
           <a:p>
             <a:fld id="{0D3E6E08-9DEF-8541-B93C-8A20B69D139D}" type="datetimeFigureOut">
               <a:rPr lang="en-US" smtClean="0"/>
-              <a:t>5/24/22</a:t>
+              <a:t>10/27/22</a:t>
             </a:fld>
             <a:endParaRPr lang="en-US"/>
           </a:p>
@@ -1821,7 +1821,7 @@
           <a:p>
             <a:fld id="{0D3E6E08-9DEF-8541-B93C-8A20B69D139D}" type="datetimeFigureOut">
               <a:rPr lang="en-US" smtClean="0"/>
-              <a:t>5/24/22</a:t>
+              <a:t>10/27/22</a:t>
             </a:fld>
             <a:endParaRPr lang="en-US"/>
           </a:p>
@@ -2098,7 +2098,7 @@
           <a:p>
             <a:fld id="{0D3E6E08-9DEF-8541-B93C-8A20B69D139D}" type="datetimeFigureOut">
               <a:rPr lang="en-US" smtClean="0"/>
-              <a:t>5/24/22</a:t>
+              <a:t>10/27/22</a:t>
             </a:fld>
             <a:endParaRPr lang="en-US"/>
           </a:p>
@@ -2355,7 +2355,7 @@
           <a:p>
             <a:fld id="{0D3E6E08-9DEF-8541-B93C-8A20B69D139D}" type="datetimeFigureOut">
               <a:rPr lang="en-US" smtClean="0"/>
-              <a:t>5/24/22</a:t>
+              <a:t>10/27/22</a:t>
             </a:fld>
             <a:endParaRPr lang="en-US"/>
           </a:p>
@@ -2568,7 +2568,7 @@
           <a:p>
             <a:fld id="{0D3E6E08-9DEF-8541-B93C-8A20B69D139D}" type="datetimeFigureOut">
               <a:rPr lang="en-US" smtClean="0"/>
-              <a:t>5/24/22</a:t>
+              <a:t>10/27/22</a:t>
             </a:fld>
             <a:endParaRPr lang="en-US"/>
           </a:p>
@@ -2975,6 +2975,66 @@
       </p:grpSpPr>
       <p:pic>
         <p:nvPicPr>
+          <p:cNvPr id="5" name="Picture 4">
+            <a:extLst>
+              <a:ext uri="{FF2B5EF4-FFF2-40B4-BE49-F238E27FC236}">
+                <a16:creationId xmlns:a16="http://schemas.microsoft.com/office/drawing/2014/main" id="{C93E23DD-54B7-2D90-B2D1-039A2BAF521C}"/>
+              </a:ext>
+            </a:extLst>
+          </p:cNvPr>
+          <p:cNvPicPr>
+            <a:picLocks noChangeAspect="1"/>
+          </p:cNvPicPr>
+          <p:nvPr/>
+        </p:nvPicPr>
+        <p:blipFill>
+          <a:blip r:embed="rId2"/>
+          <a:stretch>
+            <a:fillRect/>
+          </a:stretch>
+        </p:blipFill>
+        <p:spPr>
+          <a:xfrm>
+            <a:off x="4188618" y="424687"/>
+            <a:ext cx="4844512" cy="6863058"/>
+          </a:xfrm>
+          <a:prstGeom prst="rect">
+            <a:avLst/>
+          </a:prstGeom>
+        </p:spPr>
+      </p:pic>
+      <p:pic>
+        <p:nvPicPr>
+          <p:cNvPr id="3" name="Picture 2">
+            <a:extLst>
+              <a:ext uri="{FF2B5EF4-FFF2-40B4-BE49-F238E27FC236}">
+                <a16:creationId xmlns:a16="http://schemas.microsoft.com/office/drawing/2014/main" id="{822F8B52-E92A-8A6D-9277-9DBE42249ED4}"/>
+              </a:ext>
+            </a:extLst>
+          </p:cNvPr>
+          <p:cNvPicPr>
+            <a:picLocks noChangeAspect="1"/>
+          </p:cNvPicPr>
+          <p:nvPr/>
+        </p:nvPicPr>
+        <p:blipFill>
+          <a:blip r:embed="rId3"/>
+          <a:stretch>
+            <a:fillRect/>
+          </a:stretch>
+        </p:blipFill>
+        <p:spPr>
+          <a:xfrm>
+            <a:off x="-53547" y="435582"/>
+            <a:ext cx="4836821" cy="6852163"/>
+          </a:xfrm>
+          <a:prstGeom prst="rect">
+            <a:avLst/>
+          </a:prstGeom>
+        </p:spPr>
+      </p:pic>
+      <p:pic>
+        <p:nvPicPr>
           <p:cNvPr id="50" name="Picture 49">
             <a:extLst>
               <a:ext uri="{FF2B5EF4-FFF2-40B4-BE49-F238E27FC236}">
@@ -2988,7 +3048,7 @@
           <p:nvPr/>
         </p:nvPicPr>
         <p:blipFill rotWithShape="1">
-          <a:blip r:embed="rId2"/>
+          <a:blip r:embed="rId4"/>
           <a:srcRect l="10348" b="7289"/>
           <a:stretch/>
         </p:blipFill>
@@ -3017,7 +3077,7 @@
           <p:nvPr/>
         </p:nvPicPr>
         <p:blipFill rotWithShape="1">
-          <a:blip r:embed="rId3"/>
+          <a:blip r:embed="rId5"/>
           <a:srcRect l="10785" b="7034"/>
           <a:stretch/>
         </p:blipFill>
@@ -3046,7 +3106,7 @@
           <p:nvPr/>
         </p:nvPicPr>
         <p:blipFill rotWithShape="1">
-          <a:blip r:embed="rId4"/>
+          <a:blip r:embed="rId6"/>
           <a:srcRect l="11555" b="7289"/>
           <a:stretch/>
         </p:blipFill>
@@ -3075,7 +3135,7 @@
           <p:nvPr/>
         </p:nvPicPr>
         <p:blipFill rotWithShape="1">
-          <a:blip r:embed="rId5"/>
+          <a:blip r:embed="rId7"/>
           <a:srcRect l="11765" b="7289"/>
           <a:stretch/>
         </p:blipFill>
@@ -3083,35 +3143,6 @@
           <a:xfrm>
             <a:off x="9150090" y="487178"/>
             <a:ext cx="2148840" cy="3198594"/>
-          </a:xfrm>
-          <a:prstGeom prst="rect">
-            <a:avLst/>
-          </a:prstGeom>
-        </p:spPr>
-      </p:pic>
-      <p:pic>
-        <p:nvPicPr>
-          <p:cNvPr id="54" name="Picture 53">
-            <a:extLst>
-              <a:ext uri="{FF2B5EF4-FFF2-40B4-BE49-F238E27FC236}">
-                <a16:creationId xmlns:a16="http://schemas.microsoft.com/office/drawing/2014/main" id="{1D5EDFEA-96D3-E443-BBD1-B50C827F8FC3}"/>
-              </a:ext>
-            </a:extLst>
-          </p:cNvPr>
-          <p:cNvPicPr>
-            <a:picLocks noChangeAspect="1"/>
-          </p:cNvPicPr>
-          <p:nvPr/>
-        </p:nvPicPr>
-        <p:blipFill rotWithShape="1">
-          <a:blip r:embed="rId6"/>
-          <a:srcRect l="9852"/>
-          <a:stretch/>
-        </p:blipFill>
-        <p:spPr>
-          <a:xfrm>
-            <a:off x="4652080" y="424688"/>
-            <a:ext cx="4364015" cy="6858000"/>
           </a:xfrm>
           <a:prstGeom prst="rect">
             <a:avLst/>
@@ -3288,36 +3319,6 @@
           </a:p>
         </p:txBody>
       </p:sp>
-      <p:pic>
-        <p:nvPicPr>
-          <p:cNvPr id="59" name="Picture 58">
-            <a:extLst>
-              <a:ext uri="{FF2B5EF4-FFF2-40B4-BE49-F238E27FC236}">
-                <a16:creationId xmlns:a16="http://schemas.microsoft.com/office/drawing/2014/main" id="{D571F712-BE50-B44B-8113-48B43440EA18}"/>
-              </a:ext>
-            </a:extLst>
-          </p:cNvPr>
-          <p:cNvPicPr>
-            <a:picLocks noChangeAspect="1"/>
-          </p:cNvPicPr>
-          <p:nvPr/>
-        </p:nvPicPr>
-        <p:blipFill>
-          <a:blip r:embed="rId7"/>
-          <a:stretch>
-            <a:fillRect/>
-          </a:stretch>
-        </p:blipFill>
-        <p:spPr>
-          <a:xfrm>
-            <a:off x="-63750" y="426464"/>
-            <a:ext cx="4840941" cy="6858000"/>
-          </a:xfrm>
-          <a:prstGeom prst="rect">
-            <a:avLst/>
-          </a:prstGeom>
-        </p:spPr>
-      </p:pic>
       <p:sp>
         <p:nvSpPr>
           <p:cNvPr id="60" name="TextBox 59">
@@ -3585,16 +3586,14 @@
         </p:nvSpPr>
         <p:spPr>
           <a:xfrm>
-            <a:off x="3603685" y="4421851"/>
+            <a:off x="3603685" y="4432737"/>
             <a:ext cx="944880" cy="430887"/>
           </a:xfrm>
           <a:prstGeom prst="rect">
             <a:avLst/>
           </a:prstGeom>
           <a:solidFill>
-            <a:srgbClr val="FFFFFF">
-              <a:alpha val="73725"/>
-            </a:srgbClr>
+            <a:srgbClr val="FFFFFF"/>
           </a:solidFill>
           <a:ln w="3175">
             <a:noFill/>
@@ -3645,16 +3644,14 @@
         </p:nvSpPr>
         <p:spPr>
           <a:xfrm>
-            <a:off x="7845853" y="4421851"/>
+            <a:off x="7860141" y="4421851"/>
             <a:ext cx="944880" cy="430887"/>
           </a:xfrm>
           <a:prstGeom prst="rect">
             <a:avLst/>
           </a:prstGeom>
           <a:solidFill>
-            <a:srgbClr val="FFFFFF">
-              <a:alpha val="73725"/>
-            </a:srgbClr>
+            <a:srgbClr val="FFFFFF"/>
           </a:solidFill>
           <a:ln w="3175">
             <a:noFill/>

</xml_diff>